<commit_message>
chartProcessor and pie chart demo
</commit_message>
<xml_diff>
--- a/src/test/resources/chart.pptx
+++ b/src/test/resources/chart.pptx
@@ -245,16 +245,16 @@
               <c:strCache>
                 <c:ptCount val="4"/>
                 <c:pt idx="0">
-                  <c:v>第一季度</c:v>
+                  <c:v>第1季度</c:v>
                 </c:pt>
                 <c:pt idx="1">
-                  <c:v>第二季度</c:v>
+                  <c:v>第2季度</c:v>
                 </c:pt>
                 <c:pt idx="2">
-                  <c:v>第三季度</c:v>
+                  <c:v>第3季度</c:v>
                 </c:pt>
                 <c:pt idx="3">
-                  <c:v>第四季度</c:v>
+                  <c:v>第4季度</c:v>
                 </c:pt>
               </c:strCache>
             </c:strRef>
@@ -404,8 +404,10 @@
     <c:autoTitleDeleted val="0"/>
     <c:plotArea>
       <c:layout/>
-      <c:pieChart>
-        <c:varyColors val="1"/>
+      <c:barChart>
+        <c:barDir val="col"/>
+        <c:grouping val="stacked"/>
+        <c:varyColors val="0"/>
         <c:ser>
           <c:idx val="0"/>
           <c:order val="0"/>
@@ -415,73 +417,21 @@
               <c:strCache>
                 <c:ptCount val="1"/>
                 <c:pt idx="0">
-                  <c:v>标题B</c:v>
+                  <c:v>系列 1</c:v>
                 </c:pt>
               </c:strCache>
             </c:strRef>
           </c:tx>
-          <c:spPr/>
-          <c:explosion val="0"/>
-          <c:dPt>
-            <c:idx val="0"/>
-            <c:bubble3D val="0"/>
-            <c:spPr>
-              <a:solidFill>
-                <a:schemeClr val="accent1"/>
-              </a:solidFill>
-              <a:ln w="19050">
-                <a:solidFill>
-                  <a:schemeClr val="lt1"/>
-                </a:solidFill>
-              </a:ln>
-              <a:effectLst/>
-            </c:spPr>
-          </c:dPt>
-          <c:dPt>
-            <c:idx val="1"/>
-            <c:bubble3D val="0"/>
-            <c:spPr>
-              <a:solidFill>
-                <a:schemeClr val="accent2"/>
-              </a:solidFill>
-              <a:ln w="19050">
-                <a:solidFill>
-                  <a:schemeClr val="lt1"/>
-                </a:solidFill>
-              </a:ln>
-              <a:effectLst/>
-            </c:spPr>
-          </c:dPt>
-          <c:dPt>
-            <c:idx val="2"/>
-            <c:bubble3D val="0"/>
-            <c:spPr>
-              <a:solidFill>
-                <a:schemeClr val="accent3"/>
-              </a:solidFill>
-              <a:ln w="19050">
-                <a:solidFill>
-                  <a:schemeClr val="lt1"/>
-                </a:solidFill>
-              </a:ln>
-              <a:effectLst/>
-            </c:spPr>
-          </c:dPt>
-          <c:dPt>
-            <c:idx val="3"/>
-            <c:bubble3D val="0"/>
-            <c:spPr>
-              <a:solidFill>
-                <a:schemeClr val="accent4"/>
-              </a:solidFill>
-              <a:ln w="19050">
-                <a:solidFill>
-                  <a:schemeClr val="lt1"/>
-                </a:solidFill>
-              </a:ln>
-              <a:effectLst/>
-            </c:spPr>
-          </c:dPt>
+          <c:spPr>
+            <a:solidFill>
+              <a:schemeClr val="accent1"/>
+            </a:solidFill>
+            <a:ln>
+              <a:noFill/>
+            </a:ln>
+            <a:effectLst/>
+          </c:spPr>
+          <c:invertIfNegative val="0"/>
           <c:dLbls>
             <c:delete val="1"/>
           </c:dLbls>
@@ -491,16 +441,16 @@
               <c:strCache>
                 <c:ptCount val="4"/>
                 <c:pt idx="0">
-                  <c:v>第一季度</c:v>
+                  <c:v>类别 1</c:v>
                 </c:pt>
                 <c:pt idx="1">
-                  <c:v>第二季度</c:v>
+                  <c:v>类别 2</c:v>
                 </c:pt>
                 <c:pt idx="2">
-                  <c:v>第三季度</c:v>
+                  <c:v>类别 3</c:v>
                 </c:pt>
                 <c:pt idx="3">
-                  <c:v>第四季度</c:v>
+                  <c:v>类别 4</c:v>
                 </c:pt>
               </c:strCache>
             </c:strRef>
@@ -512,16 +462,154 @@
                 <c:formatCode>General</c:formatCode>
                 <c:ptCount val="4"/>
                 <c:pt idx="0">
-                  <c:v>8.2</c:v>
+                  <c:v>4.3</c:v>
                 </c:pt>
                 <c:pt idx="1">
-                  <c:v>3.2</c:v>
+                  <c:v>2.5</c:v>
                 </c:pt>
                 <c:pt idx="2">
-                  <c:v>1.4</c:v>
+                  <c:v>3.5</c:v>
                 </c:pt>
                 <c:pt idx="3">
-                  <c:v>1.2</c:v>
+                  <c:v>4.5</c:v>
+                </c:pt>
+              </c:numCache>
+            </c:numRef>
+          </c:val>
+        </c:ser>
+        <c:ser>
+          <c:idx val="1"/>
+          <c:order val="1"/>
+          <c:tx>
+            <c:strRef>
+              <c:f>Sheet1!$C$1</c:f>
+              <c:strCache>
+                <c:ptCount val="1"/>
+                <c:pt idx="0">
+                  <c:v>系列 2</c:v>
+                </c:pt>
+              </c:strCache>
+            </c:strRef>
+          </c:tx>
+          <c:spPr>
+            <a:solidFill>
+              <a:schemeClr val="accent2"/>
+            </a:solidFill>
+            <a:ln>
+              <a:noFill/>
+            </a:ln>
+            <a:effectLst/>
+          </c:spPr>
+          <c:invertIfNegative val="0"/>
+          <c:dLbls>
+            <c:delete val="1"/>
+          </c:dLbls>
+          <c:cat>
+            <c:strRef>
+              <c:f>Sheet1!$A$2:$A$5</c:f>
+              <c:strCache>
+                <c:ptCount val="4"/>
+                <c:pt idx="0">
+                  <c:v>类别 1</c:v>
+                </c:pt>
+                <c:pt idx="1">
+                  <c:v>类别 2</c:v>
+                </c:pt>
+                <c:pt idx="2">
+                  <c:v>类别 3</c:v>
+                </c:pt>
+                <c:pt idx="3">
+                  <c:v>类别 4</c:v>
+                </c:pt>
+              </c:strCache>
+            </c:strRef>
+          </c:cat>
+          <c:val>
+            <c:numRef>
+              <c:f>Sheet1!$C$2:$C$5</c:f>
+              <c:numCache>
+                <c:formatCode>General</c:formatCode>
+                <c:ptCount val="4"/>
+                <c:pt idx="0">
+                  <c:v>2.4</c:v>
+                </c:pt>
+                <c:pt idx="1">
+                  <c:v>4.4</c:v>
+                </c:pt>
+                <c:pt idx="2">
+                  <c:v>1.8</c:v>
+                </c:pt>
+                <c:pt idx="3">
+                  <c:v>2.8</c:v>
+                </c:pt>
+              </c:numCache>
+            </c:numRef>
+          </c:val>
+        </c:ser>
+        <c:ser>
+          <c:idx val="2"/>
+          <c:order val="2"/>
+          <c:tx>
+            <c:strRef>
+              <c:f>Sheet1!$D$1</c:f>
+              <c:strCache>
+                <c:ptCount val="1"/>
+                <c:pt idx="0">
+                  <c:v>系列 3</c:v>
+                </c:pt>
+              </c:strCache>
+            </c:strRef>
+          </c:tx>
+          <c:spPr>
+            <a:solidFill>
+              <a:schemeClr val="accent3"/>
+            </a:solidFill>
+            <a:ln>
+              <a:noFill/>
+            </a:ln>
+            <a:effectLst/>
+          </c:spPr>
+          <c:invertIfNegative val="0"/>
+          <c:dLbls>
+            <c:delete val="1"/>
+          </c:dLbls>
+          <c:cat>
+            <c:strRef>
+              <c:f>Sheet1!$A$2:$A$5</c:f>
+              <c:strCache>
+                <c:ptCount val="4"/>
+                <c:pt idx="0">
+                  <c:v>类别 1</c:v>
+                </c:pt>
+                <c:pt idx="1">
+                  <c:v>类别 2</c:v>
+                </c:pt>
+                <c:pt idx="2">
+                  <c:v>类别 3</c:v>
+                </c:pt>
+                <c:pt idx="3">
+                  <c:v>类别 4</c:v>
+                </c:pt>
+              </c:strCache>
+            </c:strRef>
+          </c:cat>
+          <c:val>
+            <c:numRef>
+              <c:f>Sheet1!$D$2:$D$5</c:f>
+              <c:numCache>
+                <c:formatCode>General</c:formatCode>
+                <c:ptCount val="4"/>
+                <c:pt idx="0">
+                  <c:v>2</c:v>
+                </c:pt>
+                <c:pt idx="1">
+                  <c:v>2</c:v>
+                </c:pt>
+                <c:pt idx="2">
+                  <c:v>3</c:v>
+                </c:pt>
+                <c:pt idx="3">
+                  <c:v>5</c:v>
                 </c:pt>
               </c:numCache>
             </c:numRef>
@@ -534,10 +622,116 @@
           <c:showSerName val="0"/>
           <c:showPercent val="0"/>
           <c:showBubbleSize val="0"/>
-          <c:showLeaderLines val="1"/>
         </c:dLbls>
-        <c:firstSliceAng val="0"/>
-      </c:pieChart>
+        <c:gapWidth val="150"/>
+        <c:overlap val="100"/>
+        <c:axId val="839164795"/>
+        <c:axId val="449331304"/>
+      </c:barChart>
+      <c:catAx>
+        <c:axId val="839164795"/>
+        <c:scaling>
+          <c:orientation val="minMax"/>
+        </c:scaling>
+        <c:delete val="0"/>
+        <c:axPos val="b"/>
+        <c:majorTickMark val="none"/>
+        <c:minorTickMark val="none"/>
+        <c:tickLblPos val="nextTo"/>
+        <c:spPr>
+          <a:noFill/>
+          <a:ln w="9525" cap="flat" cmpd="sng" algn="ctr">
+            <a:solidFill>
+              <a:schemeClr val="tx1">
+                <a:lumMod val="15000"/>
+                <a:lumOff val="85000"/>
+              </a:schemeClr>
+            </a:solidFill>
+            <a:round/>
+          </a:ln>
+          <a:effectLst/>
+        </c:spPr>
+        <c:txPr>
+          <a:bodyPr rot="-60000000" spcFirstLastPara="0" vertOverflow="ellipsis" vert="horz" wrap="square" anchor="ctr" anchorCtr="1"/>
+          <a:lstStyle/>
+          <a:p>
+            <a:pPr>
+              <a:defRPr lang="zh-CN" sz="900" b="0" i="0" u="none" strike="noStrike" kern="1200" baseline="0">
+                <a:solidFill>
+                  <a:schemeClr val="tx1">
+                    <a:lumMod val="65000"/>
+                    <a:lumOff val="35000"/>
+                  </a:schemeClr>
+                </a:solidFill>
+                <a:latin typeface="+mn-lt"/>
+                <a:ea typeface="+mn-ea"/>
+                <a:cs typeface="+mn-cs"/>
+              </a:defRPr>
+            </a:pPr>
+          </a:p>
+        </c:txPr>
+        <c:crossAx val="449331304"/>
+        <c:crosses val="autoZero"/>
+        <c:auto val="1"/>
+        <c:lblAlgn val="ctr"/>
+        <c:lblOffset val="100"/>
+        <c:noMultiLvlLbl val="0"/>
+      </c:catAx>
+      <c:valAx>
+        <c:axId val="449331304"/>
+        <c:scaling>
+          <c:orientation val="minMax"/>
+        </c:scaling>
+        <c:delete val="0"/>
+        <c:axPos val="l"/>
+        <c:majorGridlines>
+          <c:spPr>
+            <a:ln w="9525" cap="flat" cmpd="sng" algn="ctr">
+              <a:solidFill>
+                <a:schemeClr val="tx1">
+                  <a:lumMod val="15000"/>
+                  <a:lumOff val="85000"/>
+                </a:schemeClr>
+              </a:solidFill>
+              <a:round/>
+            </a:ln>
+            <a:effectLst/>
+          </c:spPr>
+        </c:majorGridlines>
+        <c:numFmt formatCode="General" sourceLinked="1"/>
+        <c:majorTickMark val="none"/>
+        <c:minorTickMark val="none"/>
+        <c:tickLblPos val="nextTo"/>
+        <c:spPr>
+          <a:noFill/>
+          <a:ln>
+            <a:noFill/>
+          </a:ln>
+          <a:effectLst/>
+        </c:spPr>
+        <c:txPr>
+          <a:bodyPr rot="-60000000" spcFirstLastPara="0" vertOverflow="ellipsis" vert="horz" wrap="square" anchor="ctr" anchorCtr="1"/>
+          <a:lstStyle/>
+          <a:p>
+            <a:pPr>
+              <a:defRPr lang="zh-CN" sz="900" b="0" i="0" u="none" strike="noStrike" kern="1200" baseline="0">
+                <a:solidFill>
+                  <a:schemeClr val="tx1">
+                    <a:lumMod val="65000"/>
+                    <a:lumOff val="35000"/>
+                  </a:schemeClr>
+                </a:solidFill>
+                <a:latin typeface="+mn-lt"/>
+                <a:ea typeface="+mn-ea"/>
+                <a:cs typeface="+mn-cs"/>
+              </a:defRPr>
+            </a:pPr>
+          </a:p>
+        </c:txPr>
+        <c:crossAx val="839164795"/>
+        <c:crosses val="autoZero"/>
+        <c:crossBetween val="between"/>
+      </c:valAx>
       <c:spPr>
         <a:noFill/>
         <a:ln>
@@ -889,6 +1083,7 @@
         </c:scaling>
         <c:delete val="0"/>
         <c:axPos val="b"/>
+        <c:numFmt formatCode="General" sourceLinked="0"/>
         <c:majorTickMark val="none"/>
         <c:minorTickMark val="none"/>
         <c:tickLblPos val="nextTo"/>
@@ -1691,7 +1886,7 @@
 </file>
 
 <file path=ppt/charts/style2.xml><?xml version="1.0" encoding="utf-8"?>
-<cs:chartStyle xmlns:cs="http://schemas.microsoft.com/office/drawing/2012/chartStyle" xmlns:a="http://schemas.openxmlformats.org/drawingml/2006/main" id="251">
+<cs:chartStyle xmlns:cs="http://schemas.microsoft.com/office/drawing/2012/chartStyle" xmlns:a="http://schemas.openxmlformats.org/drawingml/2006/main" id="297">
   <cs:axisTitle>
     <cs:lnRef idx="0"/>
     <cs:fillRef idx="0"/>
@@ -1748,7 +1943,7 @@
         <a:round/>
       </a:ln>
     </cs:spPr>
-    <cs:defRPr sz="900" kern="1200"/>
+    <cs:defRPr sz="1000" kern="1200"/>
   </cs:chartArea>
   <cs:dataLabel>
     <cs:lnRef idx="0"/>
@@ -1799,13 +1994,6 @@
     <cs:fontRef idx="minor">
       <a:schemeClr val="tx1"/>
     </cs:fontRef>
-    <cs:spPr>
-      <a:ln w="19050">
-        <a:solidFill>
-          <a:schemeClr val="lt1"/>
-        </a:solidFill>
-      </a:ln>
-    </cs:spPr>
   </cs:dataPoint>
   <cs:dataPoint3D>
     <cs:lnRef idx="0"/>
@@ -1816,19 +2004,12 @@
     <cs:fontRef idx="minor">
       <a:schemeClr val="tx1"/>
     </cs:fontRef>
-    <cs:spPr>
-      <a:ln w="25400">
-        <a:solidFill>
-          <a:schemeClr val="lt1"/>
-        </a:solidFill>
-      </a:ln>
-    </cs:spPr>
   </cs:dataPoint3D>
   <cs:dataPointLine>
     <cs:lnRef idx="0">
       <cs:styleClr val="auto"/>
     </cs:lnRef>
-    <cs:fillRef idx="0"/>
+    <cs:fillRef idx="1"/>
     <cs:effectRef idx="0"/>
     <cs:fontRef idx="minor">
       <a:schemeClr val="tx1"/>
@@ -1866,7 +2047,7 @@
     <cs:lnRef idx="0">
       <cs:styleClr val="auto"/>
     </cs:lnRef>
-    <cs:fillRef idx="0"/>
+    <cs:fillRef idx="1"/>
     <cs:effectRef idx="0"/>
     <cs:fontRef idx="minor">
       <a:schemeClr val="tx1"/>
@@ -3215,7 +3396,7 @@
           <a:p>
             <a:pPr lvl="0"/>
             <a:r>
-              <a:rPr lang="zh-CN" altLang="en-US" smtClean="0"/>
+              <a:rPr lang="zh-CN" altLang="en-US"/>
               <a:t>单击此处编辑标题</a:t>
             </a:r>
             <a:endParaRPr lang="zh-CN" altLang="en-US"/>
@@ -3316,7 +3497,7 @@
           <a:p>
             <a:pPr lvl="0"/>
             <a:r>
-              <a:rPr lang="zh-CN" altLang="en-US" smtClean="0"/>
+              <a:rPr lang="zh-CN" altLang="en-US"/>
               <a:t>单击此处编辑母版标题样式</a:t>
             </a:r>
             <a:endParaRPr lang="zh-CN" altLang="en-US"/>
@@ -3350,39 +3531,39 @@
           <a:p>
             <a:pPr lvl="0"/>
             <a:r>
-              <a:rPr lang="zh-CN" altLang="en-US" smtClean="0"/>
+              <a:rPr lang="zh-CN" altLang="en-US"/>
               <a:t>单击此处编辑母版文本样式</a:t>
             </a:r>
-            <a:endParaRPr lang="zh-CN" altLang="en-US" smtClean="0"/>
+            <a:endParaRPr lang="zh-CN" altLang="en-US"/>
           </a:p>
           <a:p>
             <a:pPr lvl="1"/>
             <a:r>
-              <a:rPr lang="zh-CN" altLang="en-US" smtClean="0"/>
+              <a:rPr lang="zh-CN" altLang="en-US"/>
               <a:t>第二级</a:t>
             </a:r>
-            <a:endParaRPr lang="zh-CN" altLang="en-US" smtClean="0"/>
+            <a:endParaRPr lang="zh-CN" altLang="en-US"/>
           </a:p>
           <a:p>
             <a:pPr lvl="2"/>
             <a:r>
-              <a:rPr lang="zh-CN" altLang="en-US" smtClean="0"/>
+              <a:rPr lang="zh-CN" altLang="en-US"/>
               <a:t>第三级</a:t>
             </a:r>
-            <a:endParaRPr lang="zh-CN" altLang="en-US" smtClean="0"/>
+            <a:endParaRPr lang="zh-CN" altLang="en-US"/>
           </a:p>
           <a:p>
             <a:pPr lvl="3"/>
             <a:r>
-              <a:rPr lang="zh-CN" altLang="en-US" smtClean="0"/>
+              <a:rPr lang="zh-CN" altLang="en-US"/>
               <a:t>第四级</a:t>
             </a:r>
-            <a:endParaRPr lang="zh-CN" altLang="en-US" smtClean="0"/>
+            <a:endParaRPr lang="zh-CN" altLang="en-US"/>
           </a:p>
           <a:p>
             <a:pPr lvl="4"/>
             <a:r>
-              <a:rPr lang="zh-CN" altLang="en-US" smtClean="0"/>
+              <a:rPr lang="zh-CN" altLang="en-US"/>
               <a:t>第五级</a:t>
             </a:r>
             <a:endParaRPr lang="zh-CN" altLang="en-US"/>
@@ -3773,7 +3954,7 @@
           <a:p>
             <a:pPr lvl="0"/>
             <a:r>
-              <a:rPr lang="zh-CN" altLang="en-US" smtClean="0"/>
+              <a:rPr lang="zh-CN" altLang="en-US"/>
               <a:t>单击此处编辑母版标题样式</a:t>
             </a:r>
             <a:endParaRPr lang="zh-CN" altLang="en-US"/>
@@ -3807,39 +3988,39 @@
           <a:p>
             <a:pPr lvl="0"/>
             <a:r>
-              <a:rPr lang="zh-CN" altLang="en-US" smtClean="0"/>
+              <a:rPr lang="zh-CN" altLang="en-US"/>
               <a:t>单击此处编辑母版文本样式</a:t>
             </a:r>
-            <a:endParaRPr lang="zh-CN" altLang="en-US" smtClean="0"/>
+            <a:endParaRPr lang="zh-CN" altLang="en-US"/>
           </a:p>
           <a:p>
             <a:pPr lvl="1"/>
             <a:r>
-              <a:rPr lang="zh-CN" altLang="en-US" smtClean="0"/>
+              <a:rPr lang="zh-CN" altLang="en-US"/>
               <a:t>第二级</a:t>
             </a:r>
-            <a:endParaRPr lang="zh-CN" altLang="en-US" smtClean="0"/>
+            <a:endParaRPr lang="zh-CN" altLang="en-US"/>
           </a:p>
           <a:p>
             <a:pPr lvl="2"/>
             <a:r>
-              <a:rPr lang="zh-CN" altLang="en-US" smtClean="0"/>
+              <a:rPr lang="zh-CN" altLang="en-US"/>
               <a:t>第三级</a:t>
             </a:r>
-            <a:endParaRPr lang="zh-CN" altLang="en-US" smtClean="0"/>
+            <a:endParaRPr lang="zh-CN" altLang="en-US"/>
           </a:p>
           <a:p>
             <a:pPr lvl="3"/>
             <a:r>
-              <a:rPr lang="zh-CN" altLang="en-US" smtClean="0"/>
+              <a:rPr lang="zh-CN" altLang="en-US"/>
               <a:t>第四级</a:t>
             </a:r>
-            <a:endParaRPr lang="zh-CN" altLang="en-US" smtClean="0"/>
+            <a:endParaRPr lang="zh-CN" altLang="en-US"/>
           </a:p>
           <a:p>
             <a:pPr lvl="4"/>
             <a:r>
-              <a:rPr lang="zh-CN" altLang="en-US" smtClean="0"/>
+              <a:rPr lang="zh-CN" altLang="en-US"/>
               <a:t>第五级</a:t>
             </a:r>
             <a:endParaRPr lang="zh-CN" altLang="en-US"/>
@@ -4036,7 +4217,7 @@
           <a:p>
             <a:pPr lvl="0"/>
             <a:r>
-              <a:rPr lang="zh-CN" altLang="en-US" smtClean="0"/>
+              <a:rPr lang="zh-CN" altLang="en-US"/>
               <a:t>单击此处编辑母版标题样式</a:t>
             </a:r>
             <a:endParaRPr lang="zh-CN" altLang="en-US"/>
@@ -4151,39 +4332,39 @@
           <a:p>
             <a:pPr lvl="0"/>
             <a:r>
-              <a:rPr lang="zh-CN" altLang="en-US" smtClean="0"/>
+              <a:rPr lang="zh-CN" altLang="en-US"/>
               <a:t>单击此处编辑母版文本样式</a:t>
             </a:r>
-            <a:endParaRPr lang="zh-CN" altLang="en-US" smtClean="0"/>
+            <a:endParaRPr lang="zh-CN" altLang="en-US"/>
           </a:p>
           <a:p>
             <a:pPr lvl="1"/>
             <a:r>
-              <a:rPr lang="zh-CN" altLang="en-US" smtClean="0"/>
+              <a:rPr lang="zh-CN" altLang="en-US"/>
               <a:t>第二级</a:t>
             </a:r>
-            <a:endParaRPr lang="zh-CN" altLang="en-US" smtClean="0"/>
+            <a:endParaRPr lang="zh-CN" altLang="en-US"/>
           </a:p>
           <a:p>
             <a:pPr lvl="2"/>
             <a:r>
-              <a:rPr lang="zh-CN" altLang="en-US" smtClean="0"/>
+              <a:rPr lang="zh-CN" altLang="en-US"/>
               <a:t>第三级</a:t>
             </a:r>
-            <a:endParaRPr lang="zh-CN" altLang="en-US" smtClean="0"/>
+            <a:endParaRPr lang="zh-CN" altLang="en-US"/>
           </a:p>
           <a:p>
             <a:pPr lvl="3"/>
             <a:r>
-              <a:rPr lang="zh-CN" altLang="en-US" smtClean="0"/>
+              <a:rPr lang="zh-CN" altLang="en-US"/>
               <a:t>第四级</a:t>
             </a:r>
-            <a:endParaRPr lang="zh-CN" altLang="en-US" smtClean="0"/>
+            <a:endParaRPr lang="zh-CN" altLang="en-US"/>
           </a:p>
           <a:p>
             <a:pPr lvl="4"/>
             <a:r>
-              <a:rPr lang="zh-CN" altLang="en-US" smtClean="0"/>
+              <a:rPr lang="zh-CN" altLang="en-US"/>
               <a:t>第五级</a:t>
             </a:r>
             <a:endParaRPr lang="zh-CN" altLang="en-US"/>
@@ -4264,10 +4445,10 @@
           <a:p>
             <a:pPr lvl="0"/>
             <a:r>
-              <a:rPr lang="zh-CN" altLang="en-US" smtClean="0"/>
+              <a:rPr lang="zh-CN" altLang="en-US"/>
               <a:t>单击此处编辑文本</a:t>
             </a:r>
-            <a:endParaRPr lang="zh-CN" altLang="en-US" smtClean="0"/>
+            <a:endParaRPr lang="zh-CN" altLang="en-US"/>
           </a:p>
         </p:txBody>
       </p:sp>
@@ -4298,39 +4479,39 @@
           <a:p>
             <a:pPr lvl="0"/>
             <a:r>
-              <a:rPr lang="zh-CN" altLang="en-US" smtClean="0"/>
+              <a:rPr lang="zh-CN" altLang="en-US"/>
               <a:t>单击此处编辑母版文本样式</a:t>
             </a:r>
-            <a:endParaRPr lang="zh-CN" altLang="en-US" smtClean="0"/>
+            <a:endParaRPr lang="zh-CN" altLang="en-US"/>
           </a:p>
           <a:p>
             <a:pPr lvl="1"/>
             <a:r>
-              <a:rPr lang="zh-CN" altLang="en-US" smtClean="0"/>
+              <a:rPr lang="zh-CN" altLang="en-US"/>
               <a:t>第二级</a:t>
             </a:r>
-            <a:endParaRPr lang="zh-CN" altLang="en-US" smtClean="0"/>
+            <a:endParaRPr lang="zh-CN" altLang="en-US"/>
           </a:p>
           <a:p>
             <a:pPr lvl="2"/>
             <a:r>
-              <a:rPr lang="zh-CN" altLang="en-US" smtClean="0"/>
+              <a:rPr lang="zh-CN" altLang="en-US"/>
               <a:t>第三级</a:t>
             </a:r>
-            <a:endParaRPr lang="zh-CN" altLang="en-US" smtClean="0"/>
+            <a:endParaRPr lang="zh-CN" altLang="en-US"/>
           </a:p>
           <a:p>
             <a:pPr lvl="3"/>
             <a:r>
-              <a:rPr lang="zh-CN" altLang="en-US" smtClean="0"/>
+              <a:rPr lang="zh-CN" altLang="en-US"/>
               <a:t>第四级</a:t>
             </a:r>
-            <a:endParaRPr lang="zh-CN" altLang="en-US" smtClean="0"/>
+            <a:endParaRPr lang="zh-CN" altLang="en-US"/>
           </a:p>
           <a:p>
             <a:pPr lvl="4"/>
             <a:r>
-              <a:rPr lang="zh-CN" altLang="en-US" smtClean="0"/>
+              <a:rPr lang="zh-CN" altLang="en-US"/>
               <a:t>第五级</a:t>
             </a:r>
             <a:endParaRPr lang="zh-CN" altLang="en-US"/>
@@ -4461,7 +4642,7 @@
           <a:p>
             <a:pPr lvl="0"/>
             <a:r>
-              <a:rPr lang="zh-CN" altLang="en-US" smtClean="0"/>
+              <a:rPr lang="zh-CN" altLang="en-US"/>
               <a:t>单击此处编辑母版标题样式</a:t>
             </a:r>
             <a:endParaRPr lang="zh-CN" altLang="en-US"/>
@@ -4729,7 +4910,7 @@
           <a:p>
             <a:pPr lvl="0"/>
             <a:r>
-              <a:rPr lang="zh-CN" altLang="en-US" smtClean="0"/>
+              <a:rPr lang="zh-CN" altLang="en-US"/>
               <a:t>单击此处编辑母版文本样式</a:t>
             </a:r>
             <a:endParaRPr lang="zh-CN" altLang="en-US"/>
@@ -4891,7 +5072,7 @@
           <a:p>
             <a:pPr lvl="0"/>
             <a:r>
-              <a:rPr lang="zh-CN" altLang="en-US" smtClean="0"/>
+              <a:rPr lang="zh-CN" altLang="en-US"/>
               <a:t>单击此处编辑标题</a:t>
             </a:r>
             <a:endParaRPr lang="zh-CN" altLang="en-US"/>
@@ -5686,7 +5867,7 @@
       </p:grpSpPr>
       <p:graphicFrame>
         <p:nvGraphicFramePr>
-          <p:cNvPr id="4" name="图表 3"/>
+          <p:cNvPr id="4" name="图表 3" descr="#{ #chartA }"/>
           <p:cNvGraphicFramePr/>
           <p:nvPr/>
         </p:nvGraphicFramePr>
@@ -5702,13 +5883,13 @@
       </p:graphicFrame>
       <p:graphicFrame>
         <p:nvGraphicFramePr>
-          <p:cNvPr id="3" name="图表 2"/>
+          <p:cNvPr id="2" name="图表 1" descr="#{ #chartB }"/>
           <p:cNvGraphicFramePr/>
           <p:nvPr/>
         </p:nvGraphicFramePr>
         <p:xfrm>
-          <a:off x="6324600" y="798195"/>
-          <a:ext cx="5775325" cy="5091430"/>
+          <a:off x="5564505" y="962660"/>
+          <a:ext cx="6350000" cy="4762500"/>
         </p:xfrm>
         <a:graphic>
           <a:graphicData uri="http://schemas.openxmlformats.org/drawingml/2006/chart">
@@ -5736,7 +5917,14 @@
         <p:cNvGrpSpPr/>
         <p:nvPr/>
       </p:nvGrpSpPr>
-      <p:grpSpPr/>
+      <p:grpSpPr>
+        <a:xfrm>
+          <a:off x="0" y="0"/>
+          <a:ext cx="0" cy="0"/>
+          <a:chOff x="0" y="0"/>
+          <a:chExt cx="0" cy="0"/>
+        </a:xfrm>
+      </p:grpSpPr>
       <p:sp>
         <p:nvSpPr>
           <p:cNvPr id="2" name="标题 1"/>
@@ -5750,6 +5938,7 @@
         <p:spPr/>
         <p:txBody>
           <a:bodyPr/>
+          <a:lstStyle/>
           <a:p>
             <a:r>
               <a:rPr lang="zh-CN" altLang="en-US"/>
@@ -5761,8 +5950,10 @@
       </p:sp>
       <p:graphicFrame>
         <p:nvGraphicFramePr>
-          <p:cNvPr id="4" name="内容占位符 3"/>
-          <p:cNvGraphicFramePr/>
+          <p:cNvPr id="4" name="内容占位符 3" descr="#{ #chartC }"/>
+          <p:cNvGraphicFramePr>
+            <a:graphicFrameLocks noGrp="1"/>
+          </p:cNvGraphicFramePr>
           <p:nvPr>
             <p:ph idx="1"/>
           </p:nvPr>
@@ -6591,7 +6782,7 @@
 
 <file path=ppt/tags/tag65.xml><?xml version="1.0" encoding="utf-8"?>
 <p:tagLst xmlns:p="http://schemas.openxmlformats.org/presentationml/2006/main">
-  <p:tag name="COMMONDATA" val="eyJoZGlkIjoiMmYyM2FkNjIwN2U1MjdmZWY0NjVjYTUzNDNlYzlhZmEifQ=="/>
+  <p:tag name="COMMONDATA" val="eyJoZGlkIjoiYjBiNDk5NDhjYTE0ZDkzNWI1ODg5ZmM3NWQwODVjMDAifQ=="/>
 </p:tagLst>
 </file>
 

</xml_diff>